<commit_message>
077. Front Controller 도입 1단계 - 프론트 컨트롤러 역할을 수행할 클래스를 만든다. && Add - js-study-ch6-jimin
</commit_message>
<xml_diff>
--- a/study-note/자바/2022-10-06 내용정리.pptx
+++ b/study-note/자바/2022-10-06 내용정리.pptx
@@ -41299,9 +41299,196 @@
             <a:pPr algn="ctr"/>
             <a:r>
               <a:rPr kumimoji="1" lang="en-US" altLang="ko-Kore-KR" sz="1600" dirty="0"/>
-              <a:t>T2</a:t>
+              <a:t>T3</a:t>
             </a:r>
             <a:endParaRPr kumimoji="1" lang="ko-Kore-KR" altLang="en-US" sz="1600" dirty="0"/>
+          </a:p>
+        </p:txBody>
+      </p:sp>
+      <p:cxnSp>
+        <p:nvCxnSpPr>
+          <p:cNvPr id="42" name="구부러진 연결선[U] 41">
+            <a:extLst>
+              <a:ext uri="{FF2B5EF4-FFF2-40B4-BE49-F238E27FC236}">
+                <a16:creationId xmlns:a16="http://schemas.microsoft.com/office/drawing/2014/main" id="{754A70EC-95FC-F44B-26E6-F36AF9ECA14A}"/>
+              </a:ext>
+            </a:extLst>
+          </p:cNvPr>
+          <p:cNvCxnSpPr>
+            <a:cxnSpLocks/>
+            <a:stCxn id="4" idx="2"/>
+            <a:endCxn id="40" idx="6"/>
+          </p:cNvCxnSpPr>
+          <p:nvPr/>
+        </p:nvCxnSpPr>
+        <p:spPr>
+          <a:xfrm rot="5400000">
+            <a:off x="1668925" y="2855782"/>
+            <a:ext cx="2735308" cy="2389278"/>
+          </a:xfrm>
+          <a:prstGeom prst="curvedConnector2">
+            <a:avLst/>
+          </a:prstGeom>
+          <a:ln>
+            <a:tailEnd type="triangle"/>
+          </a:ln>
+        </p:spPr>
+        <p:style>
+          <a:lnRef idx="3">
+            <a:schemeClr val="accent1"/>
+          </a:lnRef>
+          <a:fillRef idx="0">
+            <a:schemeClr val="accent1"/>
+          </a:fillRef>
+          <a:effectRef idx="2">
+            <a:schemeClr val="accent1"/>
+          </a:effectRef>
+          <a:fontRef idx="minor">
+            <a:schemeClr val="tx1"/>
+          </a:fontRef>
+        </p:style>
+      </p:cxnSp>
+      <p:sp>
+        <p:nvSpPr>
+          <p:cNvPr id="43" name="직사각형 42">
+            <a:extLst>
+              <a:ext uri="{FF2B5EF4-FFF2-40B4-BE49-F238E27FC236}">
+                <a16:creationId xmlns:a16="http://schemas.microsoft.com/office/drawing/2014/main" id="{AA5A4594-3391-3496-EA2C-A57215722249}"/>
+              </a:ext>
+            </a:extLst>
+          </p:cNvPr>
+          <p:cNvSpPr/>
+          <p:nvPr/>
+        </p:nvSpPr>
+        <p:spPr>
+          <a:xfrm>
+            <a:off x="2673662" y="4949053"/>
+            <a:ext cx="484690" cy="310057"/>
+          </a:xfrm>
+          <a:prstGeom prst="rect">
+            <a:avLst/>
+          </a:prstGeom>
+        </p:spPr>
+        <p:style>
+          <a:lnRef idx="2">
+            <a:schemeClr val="accent1"/>
+          </a:lnRef>
+          <a:fillRef idx="1">
+            <a:schemeClr val="lt1"/>
+          </a:fillRef>
+          <a:effectRef idx="0">
+            <a:schemeClr val="accent1"/>
+          </a:effectRef>
+          <a:fontRef idx="minor">
+            <a:schemeClr val="dk1"/>
+          </a:fontRef>
+        </p:style>
+        <p:txBody>
+          <a:bodyPr rtlCol="0" anchor="ctr"/>
+          <a:lstStyle/>
+          <a:p>
+            <a:pPr algn="ctr"/>
+            <a:r>
+              <a:rPr kumimoji="1" lang="en-US" altLang="ko-KR" sz="1000"/>
+              <a:t>null </a:t>
+            </a:r>
+            <a:r>
+              <a:rPr kumimoji="1" lang="ko-KR" altLang="en-US" sz="1000" dirty="0"/>
+              <a:t>리턴</a:t>
+            </a:r>
+            <a:endParaRPr kumimoji="1" lang="en-US" altLang="ko-KR" sz="1000" dirty="0"/>
+          </a:p>
+        </p:txBody>
+      </p:sp>
+      <p:cxnSp>
+        <p:nvCxnSpPr>
+          <p:cNvPr id="46" name="구부러진 연결선[U] 45">
+            <a:extLst>
+              <a:ext uri="{FF2B5EF4-FFF2-40B4-BE49-F238E27FC236}">
+                <a16:creationId xmlns:a16="http://schemas.microsoft.com/office/drawing/2014/main" id="{026E1F8A-64B8-8C2E-0944-203CF8FC31E7}"/>
+              </a:ext>
+            </a:extLst>
+          </p:cNvPr>
+          <p:cNvCxnSpPr>
+            <a:cxnSpLocks/>
+            <a:stCxn id="40" idx="0"/>
+            <a:endCxn id="4" idx="2"/>
+          </p:cNvCxnSpPr>
+          <p:nvPr/>
+        </p:nvCxnSpPr>
+        <p:spPr>
+          <a:xfrm rot="5400000" flipH="1" flipV="1">
+            <a:off x="1668925" y="2550984"/>
+            <a:ext cx="2430509" cy="2694077"/>
+          </a:xfrm>
+          <a:prstGeom prst="curvedConnector3">
+            <a:avLst>
+              <a:gd name="adj1" fmla="val 50000"/>
+            </a:avLst>
+          </a:prstGeom>
+          <a:ln>
+            <a:tailEnd type="triangle"/>
+          </a:ln>
+        </p:spPr>
+        <p:style>
+          <a:lnRef idx="3">
+            <a:schemeClr val="accent1"/>
+          </a:lnRef>
+          <a:fillRef idx="0">
+            <a:schemeClr val="accent1"/>
+          </a:fillRef>
+          <a:effectRef idx="2">
+            <a:schemeClr val="accent1"/>
+          </a:effectRef>
+          <a:fontRef idx="minor">
+            <a:schemeClr val="tx1"/>
+          </a:fontRef>
+        </p:style>
+      </p:cxnSp>
+      <p:sp>
+        <p:nvSpPr>
+          <p:cNvPr id="44" name="직사각형 43">
+            <a:extLst>
+              <a:ext uri="{FF2B5EF4-FFF2-40B4-BE49-F238E27FC236}">
+                <a16:creationId xmlns:a16="http://schemas.microsoft.com/office/drawing/2014/main" id="{72919B29-E091-674F-AFE6-3B860E6C426B}"/>
+              </a:ext>
+            </a:extLst>
+          </p:cNvPr>
+          <p:cNvSpPr/>
+          <p:nvPr/>
+        </p:nvSpPr>
+        <p:spPr>
+          <a:xfrm>
+            <a:off x="1374111" y="4507613"/>
+            <a:ext cx="484690" cy="310057"/>
+          </a:xfrm>
+          <a:prstGeom prst="rect">
+            <a:avLst/>
+          </a:prstGeom>
+        </p:spPr>
+        <p:style>
+          <a:lnRef idx="2">
+            <a:schemeClr val="accent1"/>
+          </a:lnRef>
+          <a:fillRef idx="1">
+            <a:schemeClr val="lt1"/>
+          </a:fillRef>
+          <a:effectRef idx="0">
+            <a:schemeClr val="accent1"/>
+          </a:effectRef>
+          <a:fontRef idx="minor">
+            <a:schemeClr val="dk1"/>
+          </a:fontRef>
+        </p:style>
+        <p:txBody>
+          <a:bodyPr rtlCol="0" anchor="ctr"/>
+          <a:lstStyle/>
+          <a:p>
+            <a:pPr algn="ctr"/>
+            <a:r>
+              <a:rPr kumimoji="1" lang="en-US" altLang="ko-KR" sz="1000" dirty="0"/>
+              <a:t>get()</a:t>
+            </a:r>
           </a:p>
         </p:txBody>
       </p:sp>

</xml_diff>